<commit_message>
refine accelerated library programming model example with C++ scoped-if
</commit_message>
<xml_diff>
--- a/collateral/RISC-V-Spring-2022-CCE-CFU-Poster.pptx
+++ b/collateral/RISC-V-Spring-2022-CCE-CFU-Poster.pptx
@@ -4223,14 +4223,20 @@
               <a:rPr lang="en-US" sz="3000" dirty="0">
                 <a:latin typeface="Consolas" panose="020B0609020204030204" pitchFamily="49" charset="0"/>
               </a:rPr>
-              <a:t>CI</a:t>
+              <a:t>if (CI</a:t>
             </a:r>
             <a:r>
               <a:rPr lang="en-US" sz="3000" dirty="0">
                 <a:effectLst/>
                 <a:latin typeface="Consolas" panose="020B0609020204030204" pitchFamily="49" charset="0"/>
               </a:rPr>
-              <a:t> bitmanip(CI_ID_IBitmanip);   // </a:t>
+              <a:t> bm(CI_ID_IBitmanip); bm) // </a:t>
+            </a:r>
+            <a:r>
+              <a:rPr lang="en-US" sz="3000" b="1" dirty="0">
+                <a:latin typeface="Consolas" panose="020B0609020204030204" pitchFamily="49" charset="0"/>
+              </a:rPr>
+              <a:t>… </a:t>
             </a:r>
             <a:r>
               <a:rPr lang="en-US" sz="3000" b="1" dirty="0">
@@ -4256,34 +4262,31 @@
             </a:pPr>
             <a:r>
               <a:rPr lang="en-US" sz="3000" dirty="0">
+                <a:effectLst/>
                 <a:latin typeface="Consolas" panose="020B0609020204030204" pitchFamily="49" charset="0"/>
               </a:rPr>
-              <a:t>if (bitmanip)                   // accelerator present:</a:t>
-            </a:r>
-            <a:br>
-              <a:rPr lang="en-US" sz="3000" dirty="0">
+              <a:t>  count = cf(</a:t>
+            </a:r>
+            <a:r>
+              <a:rPr lang="en-US" sz="3000" dirty="0" err="1">
+                <a:effectLst/>
                 <a:latin typeface="Consolas" panose="020B0609020204030204" pitchFamily="49" charset="0"/>
               </a:rPr>
-            </a:br>
-            <a:r>
-              <a:rPr lang="en-US" sz="3000" dirty="0">
-                <a:latin typeface="Consolas" panose="020B0609020204030204" pitchFamily="49" charset="0"/>
-              </a:rPr>
-              <a:t>  </a:t>
+              <a:t>pcnt</a:t>
             </a:r>
             <a:r>
               <a:rPr lang="en-US" sz="3000" dirty="0">
                 <a:effectLst/>
                 <a:latin typeface="Consolas" panose="020B0609020204030204" pitchFamily="49" charset="0"/>
               </a:rPr>
-              <a:t>count = cf(pcnt_cf, data, 0); //   </a:t>
+              <a:t>, data, 0);    // </a:t>
             </a:r>
             <a:r>
               <a:rPr lang="en-US" sz="3000" b="1" dirty="0">
                 <a:effectLst/>
                 <a:latin typeface="Consolas" panose="020B0609020204030204" pitchFamily="49" charset="0"/>
               </a:rPr>
-              <a:t>cfu_reg pcnt_cf,rd,data,x0</a:t>
+              <a:t>cfu_reg pcnt,rd,data,x0</a:t>
             </a:r>
             <a:br>
               <a:rPr lang="en-US" sz="3000" dirty="0">
@@ -4296,7 +4299,7 @@
                 <a:effectLst/>
                 <a:latin typeface="Consolas" panose="020B0609020204030204" pitchFamily="49" charset="0"/>
               </a:rPr>
-              <a:t>else                            // accelerator not present:</a:t>
+              <a:t>else</a:t>
             </a:r>
             <a:br>
               <a:rPr lang="en-US" sz="3000" dirty="0">
@@ -4323,7 +4326,20 @@
                 <a:effectLst/>
                 <a:latin typeface="Consolas" panose="020B0609020204030204" pitchFamily="49" charset="0"/>
               </a:rPr>
-              <a:t>(data);       //   software version</a:t>
+              <a:t>(data);       // no CFU: </a:t>
+            </a:r>
+            <a:r>
+              <a:rPr lang="en-US" sz="3000" dirty="0">
+                <a:latin typeface="Consolas" panose="020B0609020204030204" pitchFamily="49" charset="0"/>
+              </a:rPr>
+              <a:t>use </a:t>
+            </a:r>
+            <a:r>
+              <a:rPr lang="en-US" sz="3000" dirty="0">
+                <a:effectLst/>
+                <a:latin typeface="Consolas" panose="020B0609020204030204" pitchFamily="49" charset="0"/>
+              </a:rPr>
+              <a:t>software version</a:t>
             </a:r>
             <a:endParaRPr lang="en-US" sz="3000" dirty="0">
               <a:solidFill>
@@ -14169,7 +14185,7 @@
         </p:blipFill>
         <p:spPr>
           <a:xfrm>
-            <a:off x="17094705" y="29505553"/>
+            <a:off x="17094705" y="28926131"/>
             <a:ext cx="10065810" cy="6809224"/>
           </a:xfrm>
           <a:prstGeom prst="rect">
@@ -14273,7 +14289,7 @@
         </p:blipFill>
         <p:spPr>
           <a:xfrm>
-            <a:off x="26553396" y="36627673"/>
+            <a:off x="26553396" y="36084461"/>
             <a:ext cx="1618061" cy="1607788"/>
           </a:xfrm>
           <a:prstGeom prst="rect">
@@ -14281,6 +14297,45 @@
           </a:prstGeom>
         </p:spPr>
       </p:pic>
+      <p:sp>
+        <p:nvSpPr>
+          <p:cNvPr id="4" name="TextBox 3">
+            <a:extLst>
+              <a:ext uri="{FF2B5EF4-FFF2-40B4-BE49-F238E27FC236}">
+                <a16:creationId xmlns:a16="http://schemas.microsoft.com/office/drawing/2014/main" id="{E184AA16-98EA-43C1-B5C4-7504C3DB566F}"/>
+              </a:ext>
+            </a:extLst>
+          </p:cNvPr>
+          <p:cNvSpPr txBox="1"/>
+          <p:nvPr/>
+        </p:nvSpPr>
+        <p:spPr>
+          <a:xfrm>
+            <a:off x="19603414" y="225735"/>
+            <a:ext cx="5035546" cy="646331"/>
+          </a:xfrm>
+          <a:prstGeom prst="rect">
+            <a:avLst/>
+          </a:prstGeom>
+          <a:noFill/>
+        </p:spPr>
+        <p:txBody>
+          <a:bodyPr wrap="none" rtlCol="0">
+            <a:spAutoFit/>
+          </a:bodyPr>
+          <a:lstStyle/>
+          <a:p>
+            <a:r>
+              <a:rPr lang="en-US" sz="3600" i="1" dirty="0">
+                <a:solidFill>
+                  <a:srgbClr val="FFFF00"/>
+                </a:solidFill>
+              </a:rPr>
+              <a:t>Draft Version 2202.04.27c</a:t>
+            </a:r>
+          </a:p>
+        </p:txBody>
+      </p:sp>
     </p:spTree>
     <p:extLst>
       <p:ext uri="{BB962C8B-B14F-4D97-AF65-F5344CB8AC3E}">

</xml_diff>

<commit_message>
spring 2022 RISC-V meeting poster, including link/QR code to video narration
</commit_message>
<xml_diff>
--- a/collateral/RISC-V-Spring-2022-CCE-CFU-Poster.pptx
+++ b/collateral/RISC-V-Spring-2022-CCE-CFU-Poster.pptx
@@ -206,7 +206,7 @@
           <a:p>
             <a:fld id="{2AA59500-75AC-4F11-AB67-5655674EAB2D}" type="datetimeFigureOut">
               <a:rPr lang="en-US" smtClean="0"/>
-              <a:t>4/27/2022</a:t>
+              <a:t>4/29/2022</a:t>
             </a:fld>
             <a:endParaRPr lang="en-US"/>
           </a:p>
@@ -604,7 +604,7 @@
           <a:p>
             <a:fld id="{8A151359-45F1-45F3-9E83-EF3427FBCFDC}" type="datetimeFigureOut">
               <a:rPr lang="en-US" smtClean="0"/>
-              <a:t>4/27/2022</a:t>
+              <a:t>4/29/2022</a:t>
             </a:fld>
             <a:endParaRPr lang="en-US"/>
           </a:p>
@@ -774,7 +774,7 @@
           <a:p>
             <a:fld id="{8A151359-45F1-45F3-9E83-EF3427FBCFDC}" type="datetimeFigureOut">
               <a:rPr lang="en-US" smtClean="0"/>
-              <a:t>4/27/2022</a:t>
+              <a:t>4/29/2022</a:t>
             </a:fld>
             <a:endParaRPr lang="en-US"/>
           </a:p>
@@ -954,7 +954,7 @@
           <a:p>
             <a:fld id="{8A151359-45F1-45F3-9E83-EF3427FBCFDC}" type="datetimeFigureOut">
               <a:rPr lang="en-US" smtClean="0"/>
-              <a:t>4/27/2022</a:t>
+              <a:t>4/29/2022</a:t>
             </a:fld>
             <a:endParaRPr lang="en-US"/>
           </a:p>
@@ -1124,7 +1124,7 @@
           <a:p>
             <a:fld id="{8A151359-45F1-45F3-9E83-EF3427FBCFDC}" type="datetimeFigureOut">
               <a:rPr lang="en-US" smtClean="0"/>
-              <a:t>4/27/2022</a:t>
+              <a:t>4/29/2022</a:t>
             </a:fld>
             <a:endParaRPr lang="en-US"/>
           </a:p>
@@ -1368,7 +1368,7 @@
           <a:p>
             <a:fld id="{8A151359-45F1-45F3-9E83-EF3427FBCFDC}" type="datetimeFigureOut">
               <a:rPr lang="en-US" smtClean="0"/>
-              <a:t>4/27/2022</a:t>
+              <a:t>4/29/2022</a:t>
             </a:fld>
             <a:endParaRPr lang="en-US"/>
           </a:p>
@@ -1600,7 +1600,7 @@
           <a:p>
             <a:fld id="{8A151359-45F1-45F3-9E83-EF3427FBCFDC}" type="datetimeFigureOut">
               <a:rPr lang="en-US" smtClean="0"/>
-              <a:t>4/27/2022</a:t>
+              <a:t>4/29/2022</a:t>
             </a:fld>
             <a:endParaRPr lang="en-US"/>
           </a:p>
@@ -1967,7 +1967,7 @@
           <a:p>
             <a:fld id="{8A151359-45F1-45F3-9E83-EF3427FBCFDC}" type="datetimeFigureOut">
               <a:rPr lang="en-US" smtClean="0"/>
-              <a:t>4/27/2022</a:t>
+              <a:t>4/29/2022</a:t>
             </a:fld>
             <a:endParaRPr lang="en-US"/>
           </a:p>
@@ -2085,7 +2085,7 @@
           <a:p>
             <a:fld id="{8A151359-45F1-45F3-9E83-EF3427FBCFDC}" type="datetimeFigureOut">
               <a:rPr lang="en-US" smtClean="0"/>
-              <a:t>4/27/2022</a:t>
+              <a:t>4/29/2022</a:t>
             </a:fld>
             <a:endParaRPr lang="en-US"/>
           </a:p>
@@ -2180,7 +2180,7 @@
           <a:p>
             <a:fld id="{8A151359-45F1-45F3-9E83-EF3427FBCFDC}" type="datetimeFigureOut">
               <a:rPr lang="en-US" smtClean="0"/>
-              <a:t>4/27/2022</a:t>
+              <a:t>4/29/2022</a:t>
             </a:fld>
             <a:endParaRPr lang="en-US"/>
           </a:p>
@@ -2457,7 +2457,7 @@
           <a:p>
             <a:fld id="{8A151359-45F1-45F3-9E83-EF3427FBCFDC}" type="datetimeFigureOut">
               <a:rPr lang="en-US" smtClean="0"/>
-              <a:t>4/27/2022</a:t>
+              <a:t>4/29/2022</a:t>
             </a:fld>
             <a:endParaRPr lang="en-US"/>
           </a:p>
@@ -2714,7 +2714,7 @@
           <a:p>
             <a:fld id="{8A151359-45F1-45F3-9E83-EF3427FBCFDC}" type="datetimeFigureOut">
               <a:rPr lang="en-US" smtClean="0"/>
-              <a:t>4/27/2022</a:t>
+              <a:t>4/29/2022</a:t>
             </a:fld>
             <a:endParaRPr lang="en-US"/>
           </a:p>
@@ -2927,7 +2927,7 @@
           <a:p>
             <a:fld id="{8A151359-45F1-45F3-9E83-EF3427FBCFDC}" type="datetimeFigureOut">
               <a:rPr lang="en-US" smtClean="0"/>
-              <a:t>4/27/2022</a:t>
+              <a:t>4/29/2022</a:t>
             </a:fld>
             <a:endParaRPr lang="en-US"/>
           </a:p>
@@ -5003,15 +5003,7 @@
             </a:pPr>
             <a:r>
               <a:rPr lang="en-US" sz="3600" dirty="0"/>
-              <a:t>Standard extensions layer and compose well. </a:t>
-            </a:r>
-            <a:r>
-              <a:rPr lang="en-US" sz="3600"/>
-              <a:t>Each takes </a:t>
-            </a:r>
-            <a:r>
-              <a:rPr lang="en-US" sz="3600" dirty="0"/>
-              <a:t>years to ratify</a:t>
+              <a:t>Standard extensions layer and compose well. Each takes years to ratify</a:t>
             </a:r>
           </a:p>
           <a:p>
@@ -5039,7 +5031,7 @@
             </a:r>
             <a:r>
               <a:rPr lang="en-US" sz="3600" dirty="0"/>
-              <a:t> – conflicting encodings, different means of discovery, computation, state, error handling, versioning</a:t>
+              <a:t> – conflicting encodings, different signaling, discovery, computation, state, error handling, versioning</a:t>
             </a:r>
           </a:p>
           <a:p>
@@ -6298,31 +6290,6 @@
               <a:defRPr/>
             </a:pPr>
             <a:endParaRPr lang="en-US" sz="3600" dirty="0">
-              <a:solidFill>
-                <a:prstClr val="black"/>
-              </a:solidFill>
-              <a:latin typeface="Calibri" panose="020F0502020204030204"/>
-            </a:endParaRPr>
-          </a:p>
-          <a:p>
-            <a:pPr marL="265316" marR="0" lvl="0" indent="-265316" algn="l" defTabSz="457200" rtl="0" eaLnBrk="1" fontAlgn="auto" latinLnBrk="0" hangingPunct="1">
-              <a:lnSpc>
-                <a:spcPct val="100000"/>
-              </a:lnSpc>
-              <a:spcBef>
-                <a:spcPts val="0"/>
-              </a:spcBef>
-              <a:spcAft>
-                <a:spcPts val="0"/>
-              </a:spcAft>
-              <a:buClrTx/>
-              <a:buSzTx/>
-              <a:buFont typeface="Arial" panose="020B0604020202020204" pitchFamily="34" charset="0"/>
-              <a:buChar char="•"/>
-              <a:tabLst/>
-              <a:defRPr/>
-            </a:pPr>
-            <a:endParaRPr lang="en-US" dirty="0">
               <a:solidFill>
                 <a:prstClr val="black"/>
               </a:solidFill>
@@ -14207,8 +14174,8 @@
         </p:nvSpPr>
         <p:spPr>
           <a:xfrm>
-            <a:off x="6954993" y="39777783"/>
-            <a:ext cx="16654152" cy="1669729"/>
+            <a:off x="15109372" y="39431771"/>
+            <a:ext cx="14174195" cy="1669729"/>
           </a:xfrm>
           <a:prstGeom prst="rect">
             <a:avLst/>
@@ -14297,45 +14264,118 @@
           </a:prstGeom>
         </p:spPr>
       </p:pic>
-      <p:sp>
-        <p:nvSpPr>
-          <p:cNvPr id="4" name="TextBox 3">
+      <p:grpSp>
+        <p:nvGrpSpPr>
+          <p:cNvPr id="13" name="Group 12">
             <a:extLst>
               <a:ext uri="{FF2B5EF4-FFF2-40B4-BE49-F238E27FC236}">
-                <a16:creationId xmlns:a16="http://schemas.microsoft.com/office/drawing/2014/main" id="{E184AA16-98EA-43C1-B5C4-7504C3DB566F}"/>
+                <a16:creationId xmlns:a16="http://schemas.microsoft.com/office/drawing/2014/main" id="{CB1462E9-9884-4F24-B2CF-01378942E612}"/>
               </a:ext>
             </a:extLst>
           </p:cNvPr>
-          <p:cNvSpPr txBox="1"/>
+          <p:cNvGrpSpPr/>
           <p:nvPr/>
-        </p:nvSpPr>
-        <p:spPr>
+        </p:nvGrpSpPr>
+        <p:grpSpPr>
           <a:xfrm>
-            <a:off x="19603414" y="225735"/>
-            <a:ext cx="5035546" cy="646331"/>
+            <a:off x="1123109" y="39431771"/>
+            <a:ext cx="7992154" cy="1669729"/>
+            <a:chOff x="20290970" y="38917636"/>
+            <a:chExt cx="7992154" cy="1669729"/>
           </a:xfrm>
-          <a:prstGeom prst="rect">
-            <a:avLst/>
-          </a:prstGeom>
-          <a:noFill/>
-        </p:spPr>
-        <p:txBody>
-          <a:bodyPr wrap="none" rtlCol="0">
-            <a:spAutoFit/>
-          </a:bodyPr>
-          <a:lstStyle/>
-          <a:p>
-            <a:r>
-              <a:rPr lang="en-US" sz="3600" i="1" dirty="0">
-                <a:solidFill>
-                  <a:srgbClr val="FFFF00"/>
-                </a:solidFill>
-              </a:rPr>
-              <a:t>Draft Version 2202.04.27c</a:t>
-            </a:r>
-          </a:p>
-        </p:txBody>
-      </p:sp>
+        </p:grpSpPr>
+        <p:sp>
+          <p:nvSpPr>
+            <p:cNvPr id="162" name="Rectangle 161">
+              <a:extLst>
+                <a:ext uri="{FF2B5EF4-FFF2-40B4-BE49-F238E27FC236}">
+                  <a16:creationId xmlns:a16="http://schemas.microsoft.com/office/drawing/2014/main" id="{02DA1C8D-3E21-4F32-8706-27B843EBCA79}"/>
+                </a:ext>
+              </a:extLst>
+            </p:cNvPr>
+            <p:cNvSpPr/>
+            <p:nvPr/>
+          </p:nvSpPr>
+          <p:spPr>
+            <a:xfrm>
+              <a:off x="20290970" y="38917636"/>
+              <a:ext cx="7979225" cy="1669729"/>
+            </a:xfrm>
+            <a:prstGeom prst="rect">
+              <a:avLst/>
+            </a:prstGeom>
+            <a:noFill/>
+            <a:ln w="28575">
+              <a:noFill/>
+            </a:ln>
+          </p:spPr>
+          <p:style>
+            <a:lnRef idx="2">
+              <a:schemeClr val="accent1">
+                <a:shade val="50000"/>
+              </a:schemeClr>
+            </a:lnRef>
+            <a:fillRef idx="1">
+              <a:schemeClr val="accent1"/>
+            </a:fillRef>
+            <a:effectRef idx="0">
+              <a:schemeClr val="accent1"/>
+            </a:effectRef>
+            <a:fontRef idx="minor">
+              <a:schemeClr val="lt1"/>
+            </a:fontRef>
+          </p:style>
+          <p:txBody>
+            <a:bodyPr rtlCol="0" anchor="ctr"/>
+            <a:lstStyle/>
+            <a:p>
+              <a:r>
+                <a:rPr lang="en-US" sz="3600" b="1" i="1" dirty="0">
+                  <a:solidFill>
+                    <a:sysClr val="windowText" lastClr="000000"/>
+                  </a:solidFill>
+                </a:rPr>
+                <a:t>Video narration of this poster: https://youtu.be/MPZ5wx8-03U</a:t>
+              </a:r>
+            </a:p>
+          </p:txBody>
+        </p:sp>
+        <p:pic>
+          <p:nvPicPr>
+            <p:cNvPr id="11" name="Picture 10">
+              <a:extLst>
+                <a:ext uri="{FF2B5EF4-FFF2-40B4-BE49-F238E27FC236}">
+                  <a16:creationId xmlns:a16="http://schemas.microsoft.com/office/drawing/2014/main" id="{86A3802C-DFD8-4D01-A005-145FAED14F0B}"/>
+                </a:ext>
+              </a:extLst>
+            </p:cNvPr>
+            <p:cNvPicPr>
+              <a:picLocks noChangeAspect="1"/>
+            </p:cNvPicPr>
+            <p:nvPr/>
+          </p:nvPicPr>
+          <p:blipFill>
+            <a:blip r:embed="rId17">
+              <a:extLst>
+                <a:ext uri="{28A0092B-C50C-407E-A947-70E740481C1C}">
+                  <a14:useLocalDpi xmlns:a14="http://schemas.microsoft.com/office/drawing/2010/main" val="0"/>
+                </a:ext>
+              </a:extLst>
+            </a:blip>
+            <a:srcRect/>
+            <a:stretch/>
+          </p:blipFill>
+          <p:spPr>
+            <a:xfrm>
+              <a:off x="26684590" y="38951480"/>
+              <a:ext cx="1598534" cy="1602040"/>
+            </a:xfrm>
+            <a:prstGeom prst="rect">
+              <a:avLst/>
+            </a:prstGeom>
+          </p:spPr>
+        </p:pic>
+      </p:grpSp>
     </p:spTree>
     <p:extLst>
       <p:ext uri="{BB962C8B-B14F-4D97-AF65-F5344CB8AC3E}">

</xml_diff>